<commit_message>
Update coursework/FPGA implementation of neruo-fuzzy system with improved PSO learning.pptx
</commit_message>
<xml_diff>
--- a/coursework/FPGA implementation of neruo-fuzzy system with improved PSO learning.pptx
+++ b/coursework/FPGA implementation of neruo-fuzzy system with improved PSO learning.pptx
@@ -5,13 +5,18 @@
     <p:sldMasterId id="2147483648" r:id="rId1"/>
   </p:sldMasterIdLst>
   <p:notesMasterIdLst>
-    <p:notesMasterId r:id="rId6"/>
+    <p:notesMasterId r:id="rId11"/>
   </p:notesMasterIdLst>
   <p:sldIdLst>
     <p:sldId id="256" r:id="rId2"/>
     <p:sldId id="258" r:id="rId3"/>
     <p:sldId id="257" r:id="rId4"/>
-    <p:sldId id="259" r:id="rId5"/>
+    <p:sldId id="260" r:id="rId5"/>
+    <p:sldId id="261" r:id="rId6"/>
+    <p:sldId id="263" r:id="rId7"/>
+    <p:sldId id="264" r:id="rId8"/>
+    <p:sldId id="265" r:id="rId9"/>
+    <p:sldId id="262" r:id="rId10"/>
   </p:sldIdLst>
   <p:sldSz cx="12192000" cy="6858000"/>
   <p:notesSz cx="6858000" cy="9144000"/>
@@ -118,10 +123,18 @@
             <p14:sldId id="256"/>
             <p14:sldId id="258"/>
             <p14:sldId id="257"/>
-            <p14:sldId id="259"/>
+            <p14:sldId id="260"/>
+            <p14:sldId id="261"/>
+            <p14:sldId id="263"/>
+            <p14:sldId id="264"/>
+            <p14:sldId id="265"/>
+            <p14:sldId id="262"/>
           </p14:sldIdLst>
         </p14:section>
       </p14:sectionLst>
+    </p:ext>
+    <p:ext uri="{EFAFB233-063F-42B5-8137-9DF3F51BA10A}">
+      <p15:sldGuideLst xmlns:p15="http://schemas.microsoft.com/office/powerpoint/2012/main"/>
     </p:ext>
   </p:extLst>
 </p:presentation>
@@ -209,7 +222,7 @@
           <a:p>
             <a:fld id="{14ED05DB-16E4-4CCD-B226-C16ACE307E88}" type="datetimeFigureOut">
               <a:rPr lang="en-GB" smtClean="0"/>
-              <a:t>21/10/2018</a:t>
+              <a:t>14/11/2018</a:t>
             </a:fld>
             <a:endParaRPr lang="en-GB"/>
           </a:p>
@@ -565,90 +578,6 @@
 </p:notes>
 </file>
 
-<file path=ppt/notesSlides/notesSlide2.xml><?xml version="1.0" encoding="utf-8"?>
-<p:notes xmlns:a="http://schemas.openxmlformats.org/drawingml/2006/main" xmlns:r="http://schemas.openxmlformats.org/officeDocument/2006/relationships" xmlns:p="http://schemas.openxmlformats.org/presentationml/2006/main">
-  <p:cSld>
-    <p:spTree>
-      <p:nvGrpSpPr>
-        <p:cNvPr id="1" name=""/>
-        <p:cNvGrpSpPr/>
-        <p:nvPr/>
-      </p:nvGrpSpPr>
-      <p:grpSpPr>
-        <a:xfrm>
-          <a:off x="0" y="0"/>
-          <a:ext cx="0" cy="0"/>
-          <a:chOff x="0" y="0"/>
-          <a:chExt cx="0" cy="0"/>
-        </a:xfrm>
-      </p:grpSpPr>
-      <p:sp>
-        <p:nvSpPr>
-          <p:cNvPr id="2" name="Slide Image Placeholder 1"/>
-          <p:cNvSpPr>
-            <a:spLocks noGrp="1" noRot="1" noChangeAspect="1"/>
-          </p:cNvSpPr>
-          <p:nvPr>
-            <p:ph type="sldImg"/>
-          </p:nvPr>
-        </p:nvSpPr>
-        <p:spPr/>
-      </p:sp>
-      <p:sp>
-        <p:nvSpPr>
-          <p:cNvPr id="3" name="Notes Placeholder 2"/>
-          <p:cNvSpPr>
-            <a:spLocks noGrp="1"/>
-          </p:cNvSpPr>
-          <p:nvPr>
-            <p:ph type="body" idx="1"/>
-          </p:nvPr>
-        </p:nvSpPr>
-        <p:spPr/>
-        <p:txBody>
-          <a:bodyPr/>
-          <a:lstStyle/>
-          <a:p>
-            <a:endParaRPr lang="en-GB" dirty="0"/>
-          </a:p>
-        </p:txBody>
-      </p:sp>
-      <p:sp>
-        <p:nvSpPr>
-          <p:cNvPr id="4" name="Slide Number Placeholder 3"/>
-          <p:cNvSpPr>
-            <a:spLocks noGrp="1"/>
-          </p:cNvSpPr>
-          <p:nvPr>
-            <p:ph type="sldNum" sz="quarter" idx="5"/>
-          </p:nvPr>
-        </p:nvSpPr>
-        <p:spPr/>
-        <p:txBody>
-          <a:bodyPr/>
-          <a:lstStyle/>
-          <a:p>
-            <a:fld id="{B4C36158-4B5E-4382-96C6-E0BF59F22CBC}" type="slidenum">
-              <a:rPr lang="en-GB" smtClean="0"/>
-              <a:t>4</a:t>
-            </a:fld>
-            <a:endParaRPr lang="en-GB"/>
-          </a:p>
-        </p:txBody>
-      </p:sp>
-    </p:spTree>
-    <p:extLst>
-      <p:ext uri="{BB962C8B-B14F-4D97-AF65-F5344CB8AC3E}">
-        <p14:creationId xmlns:p14="http://schemas.microsoft.com/office/powerpoint/2010/main" val="3244169103"/>
-      </p:ext>
-    </p:extLst>
-  </p:cSld>
-  <p:clrMapOvr>
-    <a:masterClrMapping/>
-  </p:clrMapOvr>
-</p:notes>
-</file>
-
 <file path=ppt/slideLayouts/slideLayout1.xml><?xml version="1.0" encoding="utf-8"?>
 <p:sldLayout xmlns:a="http://schemas.openxmlformats.org/drawingml/2006/main" xmlns:r="http://schemas.openxmlformats.org/officeDocument/2006/relationships" xmlns:p="http://schemas.openxmlformats.org/presentationml/2006/main" type="title" preserve="1">
   <p:cSld name="Title Slide">
@@ -798,7 +727,7 @@
           <a:p>
             <a:fld id="{2D3711EF-C493-4F40-ADAB-645811471EF0}" type="datetimeFigureOut">
               <a:rPr lang="en-GB" smtClean="0"/>
-              <a:t>21/10/2018</a:t>
+              <a:t>14/11/2018</a:t>
             </a:fld>
             <a:endParaRPr lang="en-GB"/>
           </a:p>
@@ -998,7 +927,7 @@
           <a:p>
             <a:fld id="{2D3711EF-C493-4F40-ADAB-645811471EF0}" type="datetimeFigureOut">
               <a:rPr lang="en-GB" smtClean="0"/>
-              <a:t>21/10/2018</a:t>
+              <a:t>14/11/2018</a:t>
             </a:fld>
             <a:endParaRPr lang="en-GB"/>
           </a:p>
@@ -1208,7 +1137,7 @@
           <a:p>
             <a:fld id="{2D3711EF-C493-4F40-ADAB-645811471EF0}" type="datetimeFigureOut">
               <a:rPr lang="en-GB" smtClean="0"/>
-              <a:t>21/10/2018</a:t>
+              <a:t>14/11/2018</a:t>
             </a:fld>
             <a:endParaRPr lang="en-GB"/>
           </a:p>
@@ -1408,7 +1337,7 @@
           <a:p>
             <a:fld id="{2D3711EF-C493-4F40-ADAB-645811471EF0}" type="datetimeFigureOut">
               <a:rPr lang="en-GB" smtClean="0"/>
-              <a:t>21/10/2018</a:t>
+              <a:t>14/11/2018</a:t>
             </a:fld>
             <a:endParaRPr lang="en-GB"/>
           </a:p>
@@ -1684,7 +1613,7 @@
           <a:p>
             <a:fld id="{2D3711EF-C493-4F40-ADAB-645811471EF0}" type="datetimeFigureOut">
               <a:rPr lang="en-GB" smtClean="0"/>
-              <a:t>21/10/2018</a:t>
+              <a:t>14/11/2018</a:t>
             </a:fld>
             <a:endParaRPr lang="en-GB"/>
           </a:p>
@@ -1952,7 +1881,7 @@
           <a:p>
             <a:fld id="{2D3711EF-C493-4F40-ADAB-645811471EF0}" type="datetimeFigureOut">
               <a:rPr lang="en-GB" smtClean="0"/>
-              <a:t>21/10/2018</a:t>
+              <a:t>14/11/2018</a:t>
             </a:fld>
             <a:endParaRPr lang="en-GB"/>
           </a:p>
@@ -2367,7 +2296,7 @@
           <a:p>
             <a:fld id="{2D3711EF-C493-4F40-ADAB-645811471EF0}" type="datetimeFigureOut">
               <a:rPr lang="en-GB" smtClean="0"/>
-              <a:t>21/10/2018</a:t>
+              <a:t>14/11/2018</a:t>
             </a:fld>
             <a:endParaRPr lang="en-GB"/>
           </a:p>
@@ -2509,7 +2438,7 @@
           <a:p>
             <a:fld id="{2D3711EF-C493-4F40-ADAB-645811471EF0}" type="datetimeFigureOut">
               <a:rPr lang="en-GB" smtClean="0"/>
-              <a:t>21/10/2018</a:t>
+              <a:t>14/11/2018</a:t>
             </a:fld>
             <a:endParaRPr lang="en-GB"/>
           </a:p>
@@ -2622,7 +2551,7 @@
           <a:p>
             <a:fld id="{2D3711EF-C493-4F40-ADAB-645811471EF0}" type="datetimeFigureOut">
               <a:rPr lang="en-GB" smtClean="0"/>
-              <a:t>21/10/2018</a:t>
+              <a:t>14/11/2018</a:t>
             </a:fld>
             <a:endParaRPr lang="en-GB"/>
           </a:p>
@@ -2935,7 +2864,7 @@
           <a:p>
             <a:fld id="{2D3711EF-C493-4F40-ADAB-645811471EF0}" type="datetimeFigureOut">
               <a:rPr lang="en-GB" smtClean="0"/>
-              <a:t>21/10/2018</a:t>
+              <a:t>14/11/2018</a:t>
             </a:fld>
             <a:endParaRPr lang="en-GB"/>
           </a:p>
@@ -3224,7 +3153,7 @@
           <a:p>
             <a:fld id="{2D3711EF-C493-4F40-ADAB-645811471EF0}" type="datetimeFigureOut">
               <a:rPr lang="en-GB" smtClean="0"/>
-              <a:t>21/10/2018</a:t>
+              <a:t>14/11/2018</a:t>
             </a:fld>
             <a:endParaRPr lang="en-GB"/>
           </a:p>
@@ -3467,7 +3396,7 @@
           <a:p>
             <a:fld id="{2D3711EF-C493-4F40-ADAB-645811471EF0}" type="datetimeFigureOut">
               <a:rPr lang="en-GB" smtClean="0"/>
-              <a:t>21/10/2018</a:t>
+              <a:t>14/11/2018</a:t>
             </a:fld>
             <a:endParaRPr lang="en-GB"/>
           </a:p>
@@ -3984,7 +3913,7 @@
             </a:r>
             <a:r>
               <a:rPr lang="en-GB" dirty="0"/>
-              <a:t> for by: Harrison Marcks</a:t>
+              <a:t> form by: Harrison Marcks</a:t>
             </a:r>
           </a:p>
         </p:txBody>
@@ -4042,7 +3971,7 @@
           <a:p>
             <a:r>
               <a:rPr lang="en-GB" dirty="0"/>
-              <a:t>Keywords/Acronyms</a:t>
+              <a:t>Keywords/Acronyms/Definitions</a:t>
             </a:r>
           </a:p>
         </p:txBody>
@@ -4130,10 +4059,10 @@
       </p:sp>
       <p:sp>
         <p:nvSpPr>
-          <p:cNvPr id="5" name="TextBox 4">
-            <a:extLst>
-              <a:ext uri="{FF2B5EF4-FFF2-40B4-BE49-F238E27FC236}">
-                <a16:creationId xmlns:a16="http://schemas.microsoft.com/office/drawing/2014/main" id="{76360B92-43B2-4BF5-8BF9-B3E0DFF285DB}"/>
+          <p:cNvPr id="4" name="TextBox 3">
+            <a:extLst>
+              <a:ext uri="{FF2B5EF4-FFF2-40B4-BE49-F238E27FC236}">
+                <a16:creationId xmlns:a16="http://schemas.microsoft.com/office/drawing/2014/main" id="{62484597-75CE-4687-B971-7BA5DD3C2066}"/>
               </a:ext>
             </a:extLst>
           </p:cNvPr>
@@ -4142,8 +4071,8 @@
         </p:nvSpPr>
         <p:spPr>
           <a:xfrm>
-            <a:off x="6095999" y="1690688"/>
-            <a:ext cx="4792133" cy="369332"/>
+            <a:off x="5892800" y="1671109"/>
+            <a:ext cx="5461000" cy="2585323"/>
           </a:xfrm>
           <a:prstGeom prst="rect">
             <a:avLst/>
@@ -4158,8 +4087,23 @@
           <a:p>
             <a:r>
               <a:rPr lang="en-GB" dirty="0"/>
-              <a:t>aa</a:t>
-            </a:r>
+              <a:t>Membership function :- A curve that defines how each point in an input is mapped to a membership value</a:t>
+            </a:r>
+          </a:p>
+          <a:p>
+            <a:endParaRPr lang="en-GB" dirty="0"/>
+          </a:p>
+          <a:p>
+            <a:r>
+              <a:rPr lang="en-GB" dirty="0"/>
+              <a:t>Fuzzy system :- true or false do not exist so much as “partially” true concepts. Easier to understand for human operators compared to Genetic Algorithms and Neural Nets, yet performs just as well in some cases.</a:t>
+            </a:r>
+          </a:p>
+          <a:p>
+            <a:endParaRPr lang="en-GB" dirty="0"/>
+          </a:p>
+          <a:p>
+            <a:endParaRPr lang="en-GB" dirty="0"/>
           </a:p>
         </p:txBody>
       </p:sp>
@@ -4371,7 +4315,7 @@
           <p:cNvPr id="2" name="Title 1">
             <a:extLst>
               <a:ext uri="{FF2B5EF4-FFF2-40B4-BE49-F238E27FC236}">
-                <a16:creationId xmlns:a16="http://schemas.microsoft.com/office/drawing/2014/main" id="{0C3C682F-96A1-48D9-BD25-6D3C3B24FC62}"/>
+                <a16:creationId xmlns:a16="http://schemas.microsoft.com/office/drawing/2014/main" id="{FFD1885E-73CB-4D33-946C-DAEA922901F7}"/>
               </a:ext>
             </a:extLst>
           </p:cNvPr>
@@ -4382,6 +4326,303 @@
             <p:ph type="title"/>
           </p:nvPr>
         </p:nvSpPr>
+        <p:spPr>
+          <a:xfrm>
+            <a:off x="7305574" y="365125"/>
+            <a:ext cx="4048225" cy="1325563"/>
+          </a:xfrm>
+        </p:spPr>
+        <p:txBody>
+          <a:bodyPr/>
+          <a:lstStyle/>
+          <a:p>
+            <a:r>
+              <a:rPr lang="en-GB" dirty="0"/>
+              <a:t>Model</a:t>
+            </a:r>
+          </a:p>
+        </p:txBody>
+      </p:sp>
+      <p:pic>
+        <p:nvPicPr>
+          <p:cNvPr id="4" name="Picture 3">
+            <a:extLst>
+              <a:ext uri="{FF2B5EF4-FFF2-40B4-BE49-F238E27FC236}">
+                <a16:creationId xmlns:a16="http://schemas.microsoft.com/office/drawing/2014/main" id="{5ED0CAE6-8BCF-43D7-ACB6-8035C1A06010}"/>
+              </a:ext>
+            </a:extLst>
+          </p:cNvPr>
+          <p:cNvPicPr>
+            <a:picLocks noChangeAspect="1"/>
+          </p:cNvPicPr>
+          <p:nvPr/>
+        </p:nvPicPr>
+        <p:blipFill rotWithShape="1">
+          <a:blip r:embed="rId2"/>
+          <a:srcRect l="7846" r="1101"/>
+          <a:stretch/>
+        </p:blipFill>
+        <p:spPr>
+          <a:xfrm>
+            <a:off x="838200" y="392179"/>
+            <a:ext cx="6201675" cy="3036821"/>
+          </a:xfrm>
+          <a:prstGeom prst="rect">
+            <a:avLst/>
+          </a:prstGeom>
+        </p:spPr>
+      </p:pic>
+      <p:sp>
+        <p:nvSpPr>
+          <p:cNvPr id="5" name="TextBox 4">
+            <a:extLst>
+              <a:ext uri="{FF2B5EF4-FFF2-40B4-BE49-F238E27FC236}">
+                <a16:creationId xmlns:a16="http://schemas.microsoft.com/office/drawing/2014/main" id="{27A303BF-D437-4695-ACD4-2479261B29FB}"/>
+              </a:ext>
+            </a:extLst>
+          </p:cNvPr>
+          <p:cNvSpPr txBox="1"/>
+          <p:nvPr/>
+        </p:nvSpPr>
+        <p:spPr>
+          <a:xfrm>
+            <a:off x="7430703" y="1443789"/>
+            <a:ext cx="4188795" cy="1754326"/>
+          </a:xfrm>
+          <a:prstGeom prst="rect">
+            <a:avLst/>
+          </a:prstGeom>
+          <a:noFill/>
+        </p:spPr>
+        <p:txBody>
+          <a:bodyPr wrap="square" rtlCol="0">
+            <a:spAutoFit/>
+          </a:bodyPr>
+          <a:lstStyle/>
+          <a:p>
+            <a:r>
+              <a:rPr lang="en-GB" u="sng" dirty="0"/>
+              <a:t>First Layer (EQ 1 or EQ 2)</a:t>
+            </a:r>
+          </a:p>
+          <a:p>
+            <a:r>
+              <a:rPr lang="en-GB" dirty="0"/>
+              <a:t>2 inputs</a:t>
+            </a:r>
+          </a:p>
+          <a:p>
+            <a:r>
+              <a:rPr lang="en-GB" dirty="0"/>
+              <a:t>Four rules ( Membership functions)</a:t>
+            </a:r>
+          </a:p>
+          <a:p>
+            <a:r>
+              <a:rPr lang="en-GB" u="sng" dirty="0"/>
+              <a:t>Second Layer </a:t>
+            </a:r>
+          </a:p>
+          <a:p>
+            <a:r>
+              <a:rPr lang="en-GB" dirty="0"/>
+              <a:t>Nodes perform algebraic product of T-Norm to determine strength of a rule firing</a:t>
+            </a:r>
+          </a:p>
+        </p:txBody>
+      </p:sp>
+      <p:sp>
+        <p:nvSpPr>
+          <p:cNvPr id="6" name="TextBox 5">
+            <a:extLst>
+              <a:ext uri="{FF2B5EF4-FFF2-40B4-BE49-F238E27FC236}">
+                <a16:creationId xmlns:a16="http://schemas.microsoft.com/office/drawing/2014/main" id="{7E494685-EB7E-4524-9106-2F41BD5E847B}"/>
+              </a:ext>
+            </a:extLst>
+          </p:cNvPr>
+          <p:cNvSpPr txBox="1"/>
+          <p:nvPr/>
+        </p:nvSpPr>
+        <p:spPr>
+          <a:xfrm>
+            <a:off x="567890" y="3561347"/>
+            <a:ext cx="4446871" cy="3139321"/>
+          </a:xfrm>
+          <a:prstGeom prst="rect">
+            <a:avLst/>
+          </a:prstGeom>
+          <a:noFill/>
+        </p:spPr>
+        <p:txBody>
+          <a:bodyPr wrap="square" rtlCol="0">
+            <a:spAutoFit/>
+          </a:bodyPr>
+          <a:lstStyle/>
+          <a:p>
+            <a:r>
+              <a:rPr lang="en-GB" u="sng" dirty="0"/>
+              <a:t>Third Layer (EQ 3)</a:t>
+            </a:r>
+          </a:p>
+          <a:p>
+            <a:r>
+              <a:rPr lang="en-GB" dirty="0"/>
+              <a:t>Computer different weight rule firings receiving all rule firings by being fully connected to layer 2. Normalised firing Strength.</a:t>
+            </a:r>
+          </a:p>
+          <a:p>
+            <a:r>
+              <a:rPr lang="en-GB" u="sng" dirty="0"/>
+              <a:t>Fourth Layer (EQ 3)</a:t>
+            </a:r>
+          </a:p>
+          <a:p>
+            <a:r>
+              <a:rPr lang="en-GB" dirty="0"/>
+              <a:t>Contributions of each rule are computed (As compared to the original input)</a:t>
+            </a:r>
+          </a:p>
+          <a:p>
+            <a:r>
+              <a:rPr lang="en-GB" u="sng" dirty="0"/>
+              <a:t>Fifth layer (EQ 3)</a:t>
+            </a:r>
+          </a:p>
+          <a:p>
+            <a:r>
+              <a:rPr lang="en-GB" dirty="0"/>
+              <a:t>Weight average de-fuzzification is performed and a crisp output is obtained</a:t>
+            </a:r>
+          </a:p>
+        </p:txBody>
+      </p:sp>
+      <p:grpSp>
+        <p:nvGrpSpPr>
+          <p:cNvPr id="9" name="Group 8">
+            <a:extLst>
+              <a:ext uri="{FF2B5EF4-FFF2-40B4-BE49-F238E27FC236}">
+                <a16:creationId xmlns:a16="http://schemas.microsoft.com/office/drawing/2014/main" id="{A12D0DFF-034A-49BC-B1D1-E1FE50C81220}"/>
+              </a:ext>
+            </a:extLst>
+          </p:cNvPr>
+          <p:cNvGrpSpPr/>
+          <p:nvPr/>
+        </p:nvGrpSpPr>
+        <p:grpSpPr>
+          <a:xfrm>
+            <a:off x="5905979" y="3871553"/>
+            <a:ext cx="5069417" cy="2259902"/>
+            <a:chOff x="5872112" y="3441153"/>
+            <a:chExt cx="5069417" cy="2259902"/>
+          </a:xfrm>
+        </p:grpSpPr>
+        <p:pic>
+          <p:nvPicPr>
+            <p:cNvPr id="7" name="Picture 6">
+              <a:extLst>
+                <a:ext uri="{FF2B5EF4-FFF2-40B4-BE49-F238E27FC236}">
+                  <a16:creationId xmlns:a16="http://schemas.microsoft.com/office/drawing/2014/main" id="{420DF25E-BD2C-4526-92C2-BD872257F94A}"/>
+                </a:ext>
+              </a:extLst>
+            </p:cNvPr>
+            <p:cNvPicPr>
+              <a:picLocks noChangeAspect="1"/>
+            </p:cNvPicPr>
+            <p:nvPr/>
+          </p:nvPicPr>
+          <p:blipFill>
+            <a:blip r:embed="rId3"/>
+            <a:stretch>
+              <a:fillRect/>
+            </a:stretch>
+          </p:blipFill>
+          <p:spPr>
+            <a:xfrm>
+              <a:off x="5872112" y="3441153"/>
+              <a:ext cx="5010150" cy="1238250"/>
+            </a:xfrm>
+            <a:prstGeom prst="rect">
+              <a:avLst/>
+            </a:prstGeom>
+          </p:spPr>
+        </p:pic>
+        <p:pic>
+          <p:nvPicPr>
+            <p:cNvPr id="8" name="Picture 7">
+              <a:extLst>
+                <a:ext uri="{FF2B5EF4-FFF2-40B4-BE49-F238E27FC236}">
+                  <a16:creationId xmlns:a16="http://schemas.microsoft.com/office/drawing/2014/main" id="{57FE3DD5-FFB2-4923-9BF8-0D7C6EB2CF0B}"/>
+                </a:ext>
+              </a:extLst>
+            </p:cNvPr>
+            <p:cNvPicPr>
+              <a:picLocks noChangeAspect="1"/>
+            </p:cNvPicPr>
+            <p:nvPr/>
+          </p:nvPicPr>
+          <p:blipFill>
+            <a:blip r:embed="rId4"/>
+            <a:stretch>
+              <a:fillRect/>
+            </a:stretch>
+          </p:blipFill>
+          <p:spPr>
+            <a:xfrm>
+              <a:off x="5940904" y="4948580"/>
+              <a:ext cx="5000625" cy="752475"/>
+            </a:xfrm>
+            <a:prstGeom prst="rect">
+              <a:avLst/>
+            </a:prstGeom>
+          </p:spPr>
+        </p:pic>
+      </p:grpSp>
+    </p:spTree>
+    <p:extLst>
+      <p:ext uri="{BB962C8B-B14F-4D97-AF65-F5344CB8AC3E}">
+        <p14:creationId xmlns:p14="http://schemas.microsoft.com/office/powerpoint/2010/main" val="793631289"/>
+      </p:ext>
+    </p:extLst>
+  </p:cSld>
+  <p:clrMapOvr>
+    <a:masterClrMapping/>
+  </p:clrMapOvr>
+</p:sld>
+</file>
+
+<file path=ppt/slides/slide5.xml><?xml version="1.0" encoding="utf-8"?>
+<p:sld xmlns:a="http://schemas.openxmlformats.org/drawingml/2006/main" xmlns:r="http://schemas.openxmlformats.org/officeDocument/2006/relationships" xmlns:p="http://schemas.openxmlformats.org/presentationml/2006/main">
+  <p:cSld>
+    <p:spTree>
+      <p:nvGrpSpPr>
+        <p:cNvPr id="1" name=""/>
+        <p:cNvGrpSpPr/>
+        <p:nvPr/>
+      </p:nvGrpSpPr>
+      <p:grpSpPr>
+        <a:xfrm>
+          <a:off x="0" y="0"/>
+          <a:ext cx="0" cy="0"/>
+          <a:chOff x="0" y="0"/>
+          <a:chExt cx="0" cy="0"/>
+        </a:xfrm>
+      </p:grpSpPr>
+      <p:sp>
+        <p:nvSpPr>
+          <p:cNvPr id="2" name="Title 1">
+            <a:extLst>
+              <a:ext uri="{FF2B5EF4-FFF2-40B4-BE49-F238E27FC236}">
+                <a16:creationId xmlns:a16="http://schemas.microsoft.com/office/drawing/2014/main" id="{09B2DC38-4E95-45E9-9212-B99167160058}"/>
+              </a:ext>
+            </a:extLst>
+          </p:cNvPr>
+          <p:cNvSpPr>
+            <a:spLocks noGrp="1"/>
+          </p:cNvSpPr>
+          <p:nvPr>
+            <p:ph type="title"/>
+          </p:nvPr>
+        </p:nvSpPr>
         <p:spPr/>
         <p:txBody>
           <a:bodyPr/>
@@ -4389,7 +4630,7 @@
           <a:p>
             <a:r>
               <a:rPr lang="en-GB" dirty="0"/>
-              <a:t>Background and related work</a:t>
+              <a:t>Results and determining</a:t>
             </a:r>
           </a:p>
         </p:txBody>
@@ -4399,7 +4640,7 @@
           <p:cNvPr id="3" name="Content Placeholder 2">
             <a:extLst>
               <a:ext uri="{FF2B5EF4-FFF2-40B4-BE49-F238E27FC236}">
-                <a16:creationId xmlns:a16="http://schemas.microsoft.com/office/drawing/2014/main" id="{81F8259B-614D-4B25-9FE2-099874FB9B01}"/>
+                <a16:creationId xmlns:a16="http://schemas.microsoft.com/office/drawing/2014/main" id="{EA5A4680-602E-4554-A966-13F05F2BB03B}"/>
               </a:ext>
             </a:extLst>
           </p:cNvPr>
@@ -4413,21 +4654,1709 @@
         <p:spPr>
           <a:xfrm>
             <a:off x="838200" y="1825625"/>
-            <a:ext cx="5139267" cy="4351338"/>
+            <a:ext cx="4622800" cy="1476375"/>
           </a:xfrm>
         </p:spPr>
         <p:txBody>
-          <a:bodyPr/>
-          <a:lstStyle/>
-          <a:p>
-            <a:endParaRPr lang="en-GB" dirty="0"/>
-          </a:p>
-        </p:txBody>
-      </p:sp>
+          <a:bodyPr>
+            <a:normAutofit/>
+          </a:bodyPr>
+          <a:lstStyle/>
+          <a:p>
+            <a:pPr marL="0" indent="0">
+              <a:buNone/>
+            </a:pPr>
+            <a:r>
+              <a:rPr lang="en-GB" sz="1800" dirty="0"/>
+              <a:t>Implementation used for license plate recognition; to determine whether a region of an image includes the license plate. It did pretty good.</a:t>
+            </a:r>
+          </a:p>
+          <a:p>
+            <a:pPr marL="0" indent="0">
+              <a:buNone/>
+            </a:pPr>
+            <a:endParaRPr lang="en-GB" sz="1800" dirty="0"/>
+          </a:p>
+        </p:txBody>
+      </p:sp>
+      <p:pic>
+        <p:nvPicPr>
+          <p:cNvPr id="5" name="Picture 4">
+            <a:extLst>
+              <a:ext uri="{FF2B5EF4-FFF2-40B4-BE49-F238E27FC236}">
+                <a16:creationId xmlns:a16="http://schemas.microsoft.com/office/drawing/2014/main" id="{D490BEBF-FB21-4A2F-BFF0-4E996F0996A6}"/>
+              </a:ext>
+            </a:extLst>
+          </p:cNvPr>
+          <p:cNvPicPr>
+            <a:picLocks noChangeAspect="1"/>
+          </p:cNvPicPr>
+          <p:nvPr/>
+        </p:nvPicPr>
+        <p:blipFill>
+          <a:blip r:embed="rId2"/>
+          <a:stretch>
+            <a:fillRect/>
+          </a:stretch>
+        </p:blipFill>
+        <p:spPr>
+          <a:xfrm>
+            <a:off x="838200" y="3309057"/>
+            <a:ext cx="4068398" cy="3089680"/>
+          </a:xfrm>
+          <a:prstGeom prst="rect">
+            <a:avLst/>
+          </a:prstGeom>
+        </p:spPr>
+      </p:pic>
+      <p:pic>
+        <p:nvPicPr>
+          <p:cNvPr id="6" name="Picture 5">
+            <a:extLst>
+              <a:ext uri="{FF2B5EF4-FFF2-40B4-BE49-F238E27FC236}">
+                <a16:creationId xmlns:a16="http://schemas.microsoft.com/office/drawing/2014/main" id="{500131BE-A5FB-41F0-9CFB-A1801215E752}"/>
+              </a:ext>
+            </a:extLst>
+          </p:cNvPr>
+          <p:cNvPicPr>
+            <a:picLocks noChangeAspect="1"/>
+          </p:cNvPicPr>
+          <p:nvPr/>
+        </p:nvPicPr>
+        <p:blipFill>
+          <a:blip r:embed="rId3"/>
+          <a:stretch>
+            <a:fillRect/>
+          </a:stretch>
+        </p:blipFill>
+        <p:spPr>
+          <a:xfrm>
+            <a:off x="5576356" y="1388232"/>
+            <a:ext cx="5777444" cy="5104643"/>
+          </a:xfrm>
+          <a:prstGeom prst="rect">
+            <a:avLst/>
+          </a:prstGeom>
+        </p:spPr>
+      </p:pic>
     </p:spTree>
     <p:extLst>
       <p:ext uri="{BB962C8B-B14F-4D97-AF65-F5344CB8AC3E}">
-        <p14:creationId xmlns:p14="http://schemas.microsoft.com/office/powerpoint/2010/main" val="2210177166"/>
+        <p14:creationId xmlns:p14="http://schemas.microsoft.com/office/powerpoint/2010/main" val="2757047686"/>
+      </p:ext>
+    </p:extLst>
+  </p:cSld>
+  <p:clrMapOvr>
+    <a:masterClrMapping/>
+  </p:clrMapOvr>
+</p:sld>
+</file>
+
+<file path=ppt/slides/slide6.xml><?xml version="1.0" encoding="utf-8"?>
+<p:sld xmlns:a="http://schemas.openxmlformats.org/drawingml/2006/main" xmlns:r="http://schemas.openxmlformats.org/officeDocument/2006/relationships" xmlns:p="http://schemas.openxmlformats.org/presentationml/2006/main">
+  <p:cSld>
+    <p:spTree>
+      <p:nvGrpSpPr>
+        <p:cNvPr id="1" name=""/>
+        <p:cNvGrpSpPr/>
+        <p:nvPr/>
+      </p:nvGrpSpPr>
+      <p:grpSpPr>
+        <a:xfrm>
+          <a:off x="0" y="0"/>
+          <a:ext cx="0" cy="0"/>
+          <a:chOff x="0" y="0"/>
+          <a:chExt cx="0" cy="0"/>
+        </a:xfrm>
+      </p:grpSpPr>
+      <p:pic>
+        <p:nvPicPr>
+          <p:cNvPr id="16" name="Picture 15">
+            <a:extLst>
+              <a:ext uri="{FF2B5EF4-FFF2-40B4-BE49-F238E27FC236}">
+                <a16:creationId xmlns:a16="http://schemas.microsoft.com/office/drawing/2014/main" id="{99165F79-348A-4003-AA3D-56DE577DD6EB}"/>
+              </a:ext>
+            </a:extLst>
+          </p:cNvPr>
+          <p:cNvPicPr>
+            <a:picLocks noChangeAspect="1"/>
+          </p:cNvPicPr>
+          <p:nvPr/>
+        </p:nvPicPr>
+        <p:blipFill>
+          <a:blip r:embed="rId2"/>
+          <a:stretch>
+            <a:fillRect/>
+          </a:stretch>
+        </p:blipFill>
+        <p:spPr>
+          <a:xfrm>
+            <a:off x="3550043" y="2713351"/>
+            <a:ext cx="4145446" cy="3403395"/>
+          </a:xfrm>
+          <a:prstGeom prst="rect">
+            <a:avLst/>
+          </a:prstGeom>
+        </p:spPr>
+      </p:pic>
+      <p:pic>
+        <p:nvPicPr>
+          <p:cNvPr id="6" name="Picture 5">
+            <a:extLst>
+              <a:ext uri="{FF2B5EF4-FFF2-40B4-BE49-F238E27FC236}">
+                <a16:creationId xmlns:a16="http://schemas.microsoft.com/office/drawing/2014/main" id="{8181CA73-3337-4F05-9C06-5AED166B1307}"/>
+              </a:ext>
+            </a:extLst>
+          </p:cNvPr>
+          <p:cNvPicPr>
+            <a:picLocks noChangeAspect="1"/>
+          </p:cNvPicPr>
+          <p:nvPr/>
+        </p:nvPicPr>
+        <p:blipFill>
+          <a:blip r:embed="rId3"/>
+          <a:stretch>
+            <a:fillRect/>
+          </a:stretch>
+        </p:blipFill>
+        <p:spPr>
+          <a:xfrm>
+            <a:off x="838200" y="1921803"/>
+            <a:ext cx="4568547" cy="1308298"/>
+          </a:xfrm>
+          <a:prstGeom prst="rect">
+            <a:avLst/>
+          </a:prstGeom>
+        </p:spPr>
+      </p:pic>
+      <p:grpSp>
+        <p:nvGrpSpPr>
+          <p:cNvPr id="15" name="Group 14">
+            <a:extLst>
+              <a:ext uri="{FF2B5EF4-FFF2-40B4-BE49-F238E27FC236}">
+                <a16:creationId xmlns:a16="http://schemas.microsoft.com/office/drawing/2014/main" id="{F43F178F-6C00-41F3-BD67-F8A5AA7359AE}"/>
+              </a:ext>
+            </a:extLst>
+          </p:cNvPr>
+          <p:cNvGrpSpPr/>
+          <p:nvPr/>
+        </p:nvGrpSpPr>
+        <p:grpSpPr>
+          <a:xfrm>
+            <a:off x="5434468" y="223572"/>
+            <a:ext cx="6494057" cy="2647084"/>
+            <a:chOff x="838200" y="1027906"/>
+            <a:chExt cx="6494057" cy="2647084"/>
+          </a:xfrm>
+        </p:grpSpPr>
+        <p:grpSp>
+          <p:nvGrpSpPr>
+            <p:cNvPr id="10" name="Group 9">
+              <a:extLst>
+                <a:ext uri="{FF2B5EF4-FFF2-40B4-BE49-F238E27FC236}">
+                  <a16:creationId xmlns:a16="http://schemas.microsoft.com/office/drawing/2014/main" id="{F79D3F3F-2972-4D97-8B1C-E509FB17D0D0}"/>
+                </a:ext>
+              </a:extLst>
+            </p:cNvPr>
+            <p:cNvGrpSpPr/>
+            <p:nvPr/>
+          </p:nvGrpSpPr>
+          <p:grpSpPr>
+            <a:xfrm>
+              <a:off x="3536680" y="1027906"/>
+              <a:ext cx="3795577" cy="2647084"/>
+              <a:chOff x="6096000" y="806906"/>
+              <a:chExt cx="4568547" cy="3186163"/>
+            </a:xfrm>
+          </p:grpSpPr>
+          <p:pic>
+            <p:nvPicPr>
+              <p:cNvPr id="5" name="Picture 4">
+                <a:extLst>
+                  <a:ext uri="{FF2B5EF4-FFF2-40B4-BE49-F238E27FC236}">
+                    <a16:creationId xmlns:a16="http://schemas.microsoft.com/office/drawing/2014/main" id="{BE5B5B48-36E1-452A-A3F7-4FB4FCB12195}"/>
+                  </a:ext>
+                </a:extLst>
+              </p:cNvPr>
+              <p:cNvPicPr>
+                <a:picLocks noChangeAspect="1"/>
+              </p:cNvPicPr>
+              <p:nvPr/>
+            </p:nvPicPr>
+            <p:blipFill>
+              <a:blip r:embed="rId4"/>
+              <a:stretch>
+                <a:fillRect/>
+              </a:stretch>
+            </p:blipFill>
+            <p:spPr>
+              <a:xfrm>
+                <a:off x="6096000" y="806906"/>
+                <a:ext cx="4568547" cy="3186163"/>
+              </a:xfrm>
+              <a:prstGeom prst="rect">
+                <a:avLst/>
+              </a:prstGeom>
+            </p:spPr>
+          </p:pic>
+          <p:sp>
+            <p:nvSpPr>
+              <p:cNvPr id="7" name="Rectangle 6">
+                <a:extLst>
+                  <a:ext uri="{FF2B5EF4-FFF2-40B4-BE49-F238E27FC236}">
+                    <a16:creationId xmlns:a16="http://schemas.microsoft.com/office/drawing/2014/main" id="{28F80F52-BAF2-4C5E-B17A-1808AED8A743}"/>
+                  </a:ext>
+                </a:extLst>
+              </p:cNvPr>
+              <p:cNvSpPr/>
+              <p:nvPr/>
+            </p:nvSpPr>
+            <p:spPr>
+              <a:xfrm>
+                <a:off x="7016817" y="806906"/>
+                <a:ext cx="2974206" cy="2831443"/>
+              </a:xfrm>
+              <a:prstGeom prst="rect">
+                <a:avLst/>
+              </a:prstGeom>
+              <a:noFill/>
+              <a:ln w="28575">
+                <a:solidFill>
+                  <a:srgbClr val="FF0000"/>
+                </a:solidFill>
+              </a:ln>
+            </p:spPr>
+            <p:style>
+              <a:lnRef idx="2">
+                <a:schemeClr val="accent1">
+                  <a:shade val="50000"/>
+                </a:schemeClr>
+              </a:lnRef>
+              <a:fillRef idx="1">
+                <a:schemeClr val="accent1"/>
+              </a:fillRef>
+              <a:effectRef idx="0">
+                <a:schemeClr val="accent1"/>
+              </a:effectRef>
+              <a:fontRef idx="minor">
+                <a:schemeClr val="lt1"/>
+              </a:fontRef>
+            </p:style>
+            <p:txBody>
+              <a:bodyPr rtlCol="0" anchor="ctr"/>
+              <a:lstStyle/>
+              <a:p>
+                <a:pPr algn="ctr"/>
+                <a:endParaRPr lang="en-GB"/>
+              </a:p>
+            </p:txBody>
+          </p:sp>
+        </p:grpSp>
+        <p:grpSp>
+          <p:nvGrpSpPr>
+            <p:cNvPr id="9" name="Group 8">
+              <a:extLst>
+                <a:ext uri="{FF2B5EF4-FFF2-40B4-BE49-F238E27FC236}">
+                  <a16:creationId xmlns:a16="http://schemas.microsoft.com/office/drawing/2014/main" id="{DDF08380-7BC5-4C39-A08B-4AE609EBF85A}"/>
+                </a:ext>
+              </a:extLst>
+            </p:cNvPr>
+            <p:cNvGrpSpPr/>
+            <p:nvPr/>
+          </p:nvGrpSpPr>
+          <p:grpSpPr>
+            <a:xfrm>
+              <a:off x="838200" y="1568478"/>
+              <a:ext cx="2559535" cy="1308298"/>
+              <a:chOff x="838200" y="1299494"/>
+              <a:chExt cx="4282084" cy="2188773"/>
+            </a:xfrm>
+          </p:grpSpPr>
+          <p:pic>
+            <p:nvPicPr>
+              <p:cNvPr id="4" name="Picture 3">
+                <a:extLst>
+                  <a:ext uri="{FF2B5EF4-FFF2-40B4-BE49-F238E27FC236}">
+                    <a16:creationId xmlns:a16="http://schemas.microsoft.com/office/drawing/2014/main" id="{3395FD5C-BDEE-4726-951D-B4056F150E38}"/>
+                  </a:ext>
+                </a:extLst>
+              </p:cNvPr>
+              <p:cNvPicPr>
+                <a:picLocks noChangeAspect="1"/>
+              </p:cNvPicPr>
+              <p:nvPr/>
+            </p:nvPicPr>
+            <p:blipFill rotWithShape="1">
+              <a:blip r:embed="rId5"/>
+              <a:srcRect l="7846" r="1101"/>
+              <a:stretch/>
+            </p:blipFill>
+            <p:spPr>
+              <a:xfrm>
+                <a:off x="838200" y="1370976"/>
+                <a:ext cx="4202815" cy="2058024"/>
+              </a:xfrm>
+              <a:prstGeom prst="rect">
+                <a:avLst/>
+              </a:prstGeom>
+            </p:spPr>
+          </p:pic>
+          <p:sp>
+            <p:nvSpPr>
+              <p:cNvPr id="8" name="Rectangle 7">
+                <a:extLst>
+                  <a:ext uri="{FF2B5EF4-FFF2-40B4-BE49-F238E27FC236}">
+                    <a16:creationId xmlns:a16="http://schemas.microsoft.com/office/drawing/2014/main" id="{0BE3209A-D219-49BD-9C0B-154E7D9CC79D}"/>
+                  </a:ext>
+                </a:extLst>
+              </p:cNvPr>
+              <p:cNvSpPr/>
+              <p:nvPr/>
+            </p:nvSpPr>
+            <p:spPr>
+              <a:xfrm>
+                <a:off x="838200" y="1299494"/>
+                <a:ext cx="4282084" cy="2188773"/>
+              </a:xfrm>
+              <a:prstGeom prst="rect">
+                <a:avLst/>
+              </a:prstGeom>
+              <a:noFill/>
+              <a:ln w="28575">
+                <a:solidFill>
+                  <a:srgbClr val="FF0000"/>
+                </a:solidFill>
+              </a:ln>
+            </p:spPr>
+            <p:style>
+              <a:lnRef idx="2">
+                <a:schemeClr val="accent1">
+                  <a:shade val="50000"/>
+                </a:schemeClr>
+              </a:lnRef>
+              <a:fillRef idx="1">
+                <a:schemeClr val="accent1"/>
+              </a:fillRef>
+              <a:effectRef idx="0">
+                <a:schemeClr val="accent1"/>
+              </a:effectRef>
+              <a:fontRef idx="minor">
+                <a:schemeClr val="lt1"/>
+              </a:fontRef>
+            </p:style>
+            <p:txBody>
+              <a:bodyPr rtlCol="0" anchor="ctr"/>
+              <a:lstStyle/>
+              <a:p>
+                <a:pPr algn="ctr"/>
+                <a:endParaRPr lang="en-GB"/>
+              </a:p>
+            </p:txBody>
+          </p:sp>
+        </p:grpSp>
+        <p:cxnSp>
+          <p:nvCxnSpPr>
+            <p:cNvPr id="12" name="Straight Arrow Connector 11">
+              <a:extLst>
+                <a:ext uri="{FF2B5EF4-FFF2-40B4-BE49-F238E27FC236}">
+                  <a16:creationId xmlns:a16="http://schemas.microsoft.com/office/drawing/2014/main" id="{7DB82786-4DB9-481B-B800-7EB52EE1557A}"/>
+                </a:ext>
+              </a:extLst>
+            </p:cNvPr>
+            <p:cNvCxnSpPr>
+              <a:stCxn id="8" idx="3"/>
+              <a:endCxn id="7" idx="1"/>
+            </p:cNvCxnSpPr>
+            <p:nvPr/>
+          </p:nvCxnSpPr>
+          <p:spPr>
+            <a:xfrm flipV="1">
+              <a:off x="3397735" y="2204096"/>
+              <a:ext cx="903965" cy="18531"/>
+            </a:xfrm>
+            <a:prstGeom prst="straightConnector1">
+              <a:avLst/>
+            </a:prstGeom>
+            <a:ln>
+              <a:solidFill>
+                <a:srgbClr val="FF0000"/>
+              </a:solidFill>
+              <a:tailEnd type="triangle"/>
+            </a:ln>
+          </p:spPr>
+          <p:style>
+            <a:lnRef idx="1">
+              <a:schemeClr val="accent1"/>
+            </a:lnRef>
+            <a:fillRef idx="0">
+              <a:schemeClr val="accent1"/>
+            </a:fillRef>
+            <a:effectRef idx="0">
+              <a:schemeClr val="accent1"/>
+            </a:effectRef>
+            <a:fontRef idx="minor">
+              <a:schemeClr val="tx1"/>
+            </a:fontRef>
+          </p:style>
+        </p:cxnSp>
+      </p:grpSp>
+      <p:sp>
+        <p:nvSpPr>
+          <p:cNvPr id="2" name="Title 1">
+            <a:extLst>
+              <a:ext uri="{FF2B5EF4-FFF2-40B4-BE49-F238E27FC236}">
+                <a16:creationId xmlns:a16="http://schemas.microsoft.com/office/drawing/2014/main" id="{0C278444-848B-4D63-88C8-960322641E70}"/>
+              </a:ext>
+            </a:extLst>
+          </p:cNvPr>
+          <p:cNvSpPr>
+            <a:spLocks noGrp="1"/>
+          </p:cNvSpPr>
+          <p:nvPr>
+            <p:ph type="title"/>
+          </p:nvPr>
+        </p:nvSpPr>
+        <p:spPr>
+          <a:xfrm>
+            <a:off x="838200" y="365125"/>
+            <a:ext cx="3361267" cy="1325563"/>
+          </a:xfrm>
+        </p:spPr>
+        <p:txBody>
+          <a:bodyPr/>
+          <a:lstStyle/>
+          <a:p>
+            <a:r>
+              <a:rPr lang="en-GB" dirty="0"/>
+              <a:t>Parallelisation</a:t>
+            </a:r>
+          </a:p>
+        </p:txBody>
+      </p:sp>
+      <p:pic>
+        <p:nvPicPr>
+          <p:cNvPr id="14" name="Picture 13">
+            <a:extLst>
+              <a:ext uri="{FF2B5EF4-FFF2-40B4-BE49-F238E27FC236}">
+                <a16:creationId xmlns:a16="http://schemas.microsoft.com/office/drawing/2014/main" id="{BCCFF9CB-EE50-4DB0-AA06-7455A0392FB8}"/>
+              </a:ext>
+            </a:extLst>
+          </p:cNvPr>
+          <p:cNvPicPr>
+            <a:picLocks noChangeAspect="1"/>
+          </p:cNvPicPr>
+          <p:nvPr/>
+        </p:nvPicPr>
+        <p:blipFill>
+          <a:blip r:embed="rId6"/>
+          <a:stretch>
+            <a:fillRect/>
+          </a:stretch>
+        </p:blipFill>
+        <p:spPr>
+          <a:xfrm>
+            <a:off x="64835" y="3627900"/>
+            <a:ext cx="3047749" cy="2019367"/>
+          </a:xfrm>
+          <a:prstGeom prst="rect">
+            <a:avLst/>
+          </a:prstGeom>
+        </p:spPr>
+      </p:pic>
+      <p:pic>
+        <p:nvPicPr>
+          <p:cNvPr id="17" name="Picture 16">
+            <a:extLst>
+              <a:ext uri="{FF2B5EF4-FFF2-40B4-BE49-F238E27FC236}">
+                <a16:creationId xmlns:a16="http://schemas.microsoft.com/office/drawing/2014/main" id="{B85ABC01-DFB7-405D-810F-C67B0ABEFBD7}"/>
+              </a:ext>
+            </a:extLst>
+          </p:cNvPr>
+          <p:cNvPicPr>
+            <a:picLocks noChangeAspect="1"/>
+          </p:cNvPicPr>
+          <p:nvPr/>
+        </p:nvPicPr>
+        <p:blipFill>
+          <a:blip r:embed="rId7"/>
+          <a:stretch>
+            <a:fillRect/>
+          </a:stretch>
+        </p:blipFill>
+        <p:spPr>
+          <a:xfrm>
+            <a:off x="8132948" y="2732791"/>
+            <a:ext cx="2600574" cy="3364517"/>
+          </a:xfrm>
+          <a:prstGeom prst="rect">
+            <a:avLst/>
+          </a:prstGeom>
+        </p:spPr>
+      </p:pic>
+      <p:sp>
+        <p:nvSpPr>
+          <p:cNvPr id="18" name="TextBox 17">
+            <a:extLst>
+              <a:ext uri="{FF2B5EF4-FFF2-40B4-BE49-F238E27FC236}">
+                <a16:creationId xmlns:a16="http://schemas.microsoft.com/office/drawing/2014/main" id="{F6534701-A5A8-4516-9C8C-9196CC79A99C}"/>
+              </a:ext>
+            </a:extLst>
+          </p:cNvPr>
+          <p:cNvSpPr txBox="1"/>
+          <p:nvPr/>
+        </p:nvSpPr>
+        <p:spPr>
+          <a:xfrm>
+            <a:off x="4784566" y="4851400"/>
+            <a:ext cx="1676400" cy="646331"/>
+          </a:xfrm>
+          <a:prstGeom prst="rect">
+            <a:avLst/>
+          </a:prstGeom>
+          <a:noFill/>
+        </p:spPr>
+        <p:txBody>
+          <a:bodyPr wrap="square" rtlCol="0">
+            <a:spAutoFit/>
+          </a:bodyPr>
+          <a:lstStyle/>
+          <a:p>
+            <a:r>
+              <a:rPr lang="en-GB" dirty="0"/>
+              <a:t>Stage 2 components</a:t>
+            </a:r>
+          </a:p>
+        </p:txBody>
+      </p:sp>
+      <p:sp>
+        <p:nvSpPr>
+          <p:cNvPr id="19" name="TextBox 18">
+            <a:extLst>
+              <a:ext uri="{FF2B5EF4-FFF2-40B4-BE49-F238E27FC236}">
+                <a16:creationId xmlns:a16="http://schemas.microsoft.com/office/drawing/2014/main" id="{FB7FE6B7-F2F0-479F-8B03-EE9600EC159B}"/>
+              </a:ext>
+            </a:extLst>
+          </p:cNvPr>
+          <p:cNvSpPr txBox="1"/>
+          <p:nvPr/>
+        </p:nvSpPr>
+        <p:spPr>
+          <a:xfrm>
+            <a:off x="211667" y="3627900"/>
+            <a:ext cx="1676400" cy="369332"/>
+          </a:xfrm>
+          <a:prstGeom prst="rect">
+            <a:avLst/>
+          </a:prstGeom>
+          <a:noFill/>
+        </p:spPr>
+        <p:txBody>
+          <a:bodyPr wrap="square" rtlCol="0">
+            <a:spAutoFit/>
+          </a:bodyPr>
+          <a:lstStyle/>
+          <a:p>
+            <a:r>
+              <a:rPr lang="en-GB" dirty="0"/>
+              <a:t>Stage 1</a:t>
+            </a:r>
+          </a:p>
+        </p:txBody>
+      </p:sp>
+      <p:sp>
+        <p:nvSpPr>
+          <p:cNvPr id="20" name="TextBox 19">
+            <a:extLst>
+              <a:ext uri="{FF2B5EF4-FFF2-40B4-BE49-F238E27FC236}">
+                <a16:creationId xmlns:a16="http://schemas.microsoft.com/office/drawing/2014/main" id="{EADBCE53-A86A-4848-B796-E1BF9690216C}"/>
+              </a:ext>
+            </a:extLst>
+          </p:cNvPr>
+          <p:cNvSpPr txBox="1"/>
+          <p:nvPr/>
+        </p:nvSpPr>
+        <p:spPr>
+          <a:xfrm>
+            <a:off x="7994003" y="4428067"/>
+            <a:ext cx="1522530" cy="369332"/>
+          </a:xfrm>
+          <a:prstGeom prst="rect">
+            <a:avLst/>
+          </a:prstGeom>
+          <a:noFill/>
+        </p:spPr>
+        <p:txBody>
+          <a:bodyPr wrap="square" rtlCol="0">
+            <a:spAutoFit/>
+          </a:bodyPr>
+          <a:lstStyle/>
+          <a:p>
+            <a:r>
+              <a:rPr lang="en-GB" dirty="0"/>
+              <a:t>Stage 3</a:t>
+            </a:r>
+          </a:p>
+        </p:txBody>
+      </p:sp>
+    </p:spTree>
+    <p:extLst>
+      <p:ext uri="{BB962C8B-B14F-4D97-AF65-F5344CB8AC3E}">
+        <p14:creationId xmlns:p14="http://schemas.microsoft.com/office/powerpoint/2010/main" val="1718452292"/>
+      </p:ext>
+    </p:extLst>
+  </p:cSld>
+  <p:clrMapOvr>
+    <a:masterClrMapping/>
+  </p:clrMapOvr>
+</p:sld>
+</file>
+
+<file path=ppt/slides/slide7.xml><?xml version="1.0" encoding="utf-8"?>
+<p:sld xmlns:a="http://schemas.openxmlformats.org/drawingml/2006/main" xmlns:r="http://schemas.openxmlformats.org/officeDocument/2006/relationships" xmlns:p="http://schemas.openxmlformats.org/presentationml/2006/main">
+  <p:cSld>
+    <p:spTree>
+      <p:nvGrpSpPr>
+        <p:cNvPr id="1" name=""/>
+        <p:cNvGrpSpPr/>
+        <p:nvPr/>
+      </p:nvGrpSpPr>
+      <p:grpSpPr>
+        <a:xfrm>
+          <a:off x="0" y="0"/>
+          <a:ext cx="0" cy="0"/>
+          <a:chOff x="0" y="0"/>
+          <a:chExt cx="0" cy="0"/>
+        </a:xfrm>
+      </p:grpSpPr>
+      <p:sp>
+        <p:nvSpPr>
+          <p:cNvPr id="2" name="Title 1">
+            <a:extLst>
+              <a:ext uri="{FF2B5EF4-FFF2-40B4-BE49-F238E27FC236}">
+                <a16:creationId xmlns:a16="http://schemas.microsoft.com/office/drawing/2014/main" id="{4EF8C73A-7E7D-4B81-ADC0-450E7D10D19C}"/>
+              </a:ext>
+            </a:extLst>
+          </p:cNvPr>
+          <p:cNvSpPr>
+            <a:spLocks noGrp="1"/>
+          </p:cNvSpPr>
+          <p:nvPr>
+            <p:ph type="title"/>
+          </p:nvPr>
+        </p:nvSpPr>
+        <p:spPr>
+          <a:xfrm>
+            <a:off x="838200" y="365125"/>
+            <a:ext cx="3462867" cy="1325563"/>
+          </a:xfrm>
+        </p:spPr>
+        <p:txBody>
+          <a:bodyPr/>
+          <a:lstStyle/>
+          <a:p>
+            <a:r>
+              <a:rPr lang="en-GB" dirty="0"/>
+              <a:t>Parallelisation</a:t>
+            </a:r>
+          </a:p>
+        </p:txBody>
+      </p:sp>
+      <p:grpSp>
+        <p:nvGrpSpPr>
+          <p:cNvPr id="16" name="Group 15">
+            <a:extLst>
+              <a:ext uri="{FF2B5EF4-FFF2-40B4-BE49-F238E27FC236}">
+                <a16:creationId xmlns:a16="http://schemas.microsoft.com/office/drawing/2014/main" id="{701430A0-1A45-48A9-8D30-BE6EE64EC906}"/>
+              </a:ext>
+            </a:extLst>
+          </p:cNvPr>
+          <p:cNvGrpSpPr/>
+          <p:nvPr/>
+        </p:nvGrpSpPr>
+        <p:grpSpPr>
+          <a:xfrm>
+            <a:off x="635000" y="1292754"/>
+            <a:ext cx="4794814" cy="2347913"/>
+            <a:chOff x="838200" y="1690688"/>
+            <a:chExt cx="5908096" cy="2893062"/>
+          </a:xfrm>
+        </p:grpSpPr>
+        <p:pic>
+          <p:nvPicPr>
+            <p:cNvPr id="4" name="Picture 3">
+              <a:extLst>
+                <a:ext uri="{FF2B5EF4-FFF2-40B4-BE49-F238E27FC236}">
+                  <a16:creationId xmlns:a16="http://schemas.microsoft.com/office/drawing/2014/main" id="{2ADA6558-0458-4597-BBB8-297627990318}"/>
+                </a:ext>
+              </a:extLst>
+            </p:cNvPr>
+            <p:cNvPicPr>
+              <a:picLocks noChangeAspect="1"/>
+            </p:cNvPicPr>
+            <p:nvPr/>
+          </p:nvPicPr>
+          <p:blipFill rotWithShape="1">
+            <a:blip r:embed="rId2"/>
+            <a:srcRect l="7846" r="1101"/>
+            <a:stretch/>
+          </p:blipFill>
+          <p:spPr>
+            <a:xfrm>
+              <a:off x="838200" y="1690688"/>
+              <a:ext cx="5908096" cy="2893062"/>
+            </a:xfrm>
+            <a:prstGeom prst="rect">
+              <a:avLst/>
+            </a:prstGeom>
+          </p:spPr>
+        </p:pic>
+        <p:cxnSp>
+          <p:nvCxnSpPr>
+            <p:cNvPr id="8" name="Straight Connector 7">
+              <a:extLst>
+                <a:ext uri="{FF2B5EF4-FFF2-40B4-BE49-F238E27FC236}">
+                  <a16:creationId xmlns:a16="http://schemas.microsoft.com/office/drawing/2014/main" id="{99A76966-34FA-4C5F-B633-6EA4F9571036}"/>
+                </a:ext>
+              </a:extLst>
+            </p:cNvPr>
+            <p:cNvCxnSpPr/>
+            <p:nvPr/>
+          </p:nvCxnSpPr>
+          <p:spPr>
+            <a:xfrm>
+              <a:off x="2438400" y="1871133"/>
+              <a:ext cx="0" cy="2712617"/>
+            </a:xfrm>
+            <a:prstGeom prst="line">
+              <a:avLst/>
+            </a:prstGeom>
+            <a:ln w="38100">
+              <a:solidFill>
+                <a:srgbClr val="FF0000"/>
+              </a:solidFill>
+            </a:ln>
+          </p:spPr>
+          <p:style>
+            <a:lnRef idx="1">
+              <a:schemeClr val="accent1"/>
+            </a:lnRef>
+            <a:fillRef idx="0">
+              <a:schemeClr val="accent1"/>
+            </a:fillRef>
+            <a:effectRef idx="0">
+              <a:schemeClr val="accent1"/>
+            </a:effectRef>
+            <a:fontRef idx="minor">
+              <a:schemeClr val="tx1"/>
+            </a:fontRef>
+          </p:style>
+        </p:cxnSp>
+        <p:cxnSp>
+          <p:nvCxnSpPr>
+            <p:cNvPr id="9" name="Straight Connector 8">
+              <a:extLst>
+                <a:ext uri="{FF2B5EF4-FFF2-40B4-BE49-F238E27FC236}">
+                  <a16:creationId xmlns:a16="http://schemas.microsoft.com/office/drawing/2014/main" id="{003EAEBF-F8B2-4500-89A3-969948D9DE53}"/>
+                </a:ext>
+              </a:extLst>
+            </p:cNvPr>
+            <p:cNvCxnSpPr/>
+            <p:nvPr/>
+          </p:nvCxnSpPr>
+          <p:spPr>
+            <a:xfrm>
+              <a:off x="3488267" y="1871133"/>
+              <a:ext cx="0" cy="2712617"/>
+            </a:xfrm>
+            <a:prstGeom prst="line">
+              <a:avLst/>
+            </a:prstGeom>
+            <a:ln w="38100">
+              <a:solidFill>
+                <a:srgbClr val="FF0000"/>
+              </a:solidFill>
+            </a:ln>
+          </p:spPr>
+          <p:style>
+            <a:lnRef idx="1">
+              <a:schemeClr val="accent1"/>
+            </a:lnRef>
+            <a:fillRef idx="0">
+              <a:schemeClr val="accent1"/>
+            </a:fillRef>
+            <a:effectRef idx="0">
+              <a:schemeClr val="accent1"/>
+            </a:effectRef>
+            <a:fontRef idx="minor">
+              <a:schemeClr val="tx1"/>
+            </a:fontRef>
+          </p:style>
+        </p:cxnSp>
+        <p:cxnSp>
+          <p:nvCxnSpPr>
+            <p:cNvPr id="10" name="Straight Connector 9">
+              <a:extLst>
+                <a:ext uri="{FF2B5EF4-FFF2-40B4-BE49-F238E27FC236}">
+                  <a16:creationId xmlns:a16="http://schemas.microsoft.com/office/drawing/2014/main" id="{0E4E4F36-E9B8-40C1-BD28-16483449D774}"/>
+                </a:ext>
+              </a:extLst>
+            </p:cNvPr>
+            <p:cNvCxnSpPr/>
+            <p:nvPr/>
+          </p:nvCxnSpPr>
+          <p:spPr>
+            <a:xfrm>
+              <a:off x="4538134" y="1871132"/>
+              <a:ext cx="0" cy="2712617"/>
+            </a:xfrm>
+            <a:prstGeom prst="line">
+              <a:avLst/>
+            </a:prstGeom>
+            <a:ln w="38100">
+              <a:solidFill>
+                <a:srgbClr val="FF0000"/>
+              </a:solidFill>
+            </a:ln>
+          </p:spPr>
+          <p:style>
+            <a:lnRef idx="1">
+              <a:schemeClr val="accent1"/>
+            </a:lnRef>
+            <a:fillRef idx="0">
+              <a:schemeClr val="accent1"/>
+            </a:fillRef>
+            <a:effectRef idx="0">
+              <a:schemeClr val="accent1"/>
+            </a:effectRef>
+            <a:fontRef idx="minor">
+              <a:schemeClr val="tx1"/>
+            </a:fontRef>
+          </p:style>
+        </p:cxnSp>
+        <p:cxnSp>
+          <p:nvCxnSpPr>
+            <p:cNvPr id="11" name="Straight Connector 10">
+              <a:extLst>
+                <a:ext uri="{FF2B5EF4-FFF2-40B4-BE49-F238E27FC236}">
+                  <a16:creationId xmlns:a16="http://schemas.microsoft.com/office/drawing/2014/main" id="{F08BD8C8-764F-4FD5-815F-C329B3BBBB24}"/>
+                </a:ext>
+              </a:extLst>
+            </p:cNvPr>
+            <p:cNvCxnSpPr>
+              <a:cxnSpLocks/>
+            </p:cNvCxnSpPr>
+            <p:nvPr/>
+          </p:nvCxnSpPr>
+          <p:spPr>
+            <a:xfrm>
+              <a:off x="1794933" y="2497667"/>
+              <a:ext cx="4269947" cy="0"/>
+            </a:xfrm>
+            <a:prstGeom prst="line">
+              <a:avLst/>
+            </a:prstGeom>
+            <a:ln w="38100">
+              <a:solidFill>
+                <a:srgbClr val="FF0000"/>
+              </a:solidFill>
+            </a:ln>
+          </p:spPr>
+          <p:style>
+            <a:lnRef idx="1">
+              <a:schemeClr val="accent1"/>
+            </a:lnRef>
+            <a:fillRef idx="0">
+              <a:schemeClr val="accent1"/>
+            </a:fillRef>
+            <a:effectRef idx="0">
+              <a:schemeClr val="accent1"/>
+            </a:effectRef>
+            <a:fontRef idx="minor">
+              <a:schemeClr val="tx1"/>
+            </a:fontRef>
+          </p:style>
+        </p:cxnSp>
+        <p:cxnSp>
+          <p:nvCxnSpPr>
+            <p:cNvPr id="14" name="Straight Connector 13">
+              <a:extLst>
+                <a:ext uri="{FF2B5EF4-FFF2-40B4-BE49-F238E27FC236}">
+                  <a16:creationId xmlns:a16="http://schemas.microsoft.com/office/drawing/2014/main" id="{368185F6-3005-4030-B3C0-B9D33F23D546}"/>
+                </a:ext>
+              </a:extLst>
+            </p:cNvPr>
+            <p:cNvCxnSpPr>
+              <a:cxnSpLocks/>
+            </p:cNvCxnSpPr>
+            <p:nvPr/>
+          </p:nvCxnSpPr>
+          <p:spPr>
+            <a:xfrm>
+              <a:off x="1794933" y="3064934"/>
+              <a:ext cx="4141156" cy="0"/>
+            </a:xfrm>
+            <a:prstGeom prst="line">
+              <a:avLst/>
+            </a:prstGeom>
+            <a:ln w="38100">
+              <a:solidFill>
+                <a:srgbClr val="FF0000"/>
+              </a:solidFill>
+            </a:ln>
+          </p:spPr>
+          <p:style>
+            <a:lnRef idx="1">
+              <a:schemeClr val="accent1"/>
+            </a:lnRef>
+            <a:fillRef idx="0">
+              <a:schemeClr val="accent1"/>
+            </a:fillRef>
+            <a:effectRef idx="0">
+              <a:schemeClr val="accent1"/>
+            </a:effectRef>
+            <a:fontRef idx="minor">
+              <a:schemeClr val="tx1"/>
+            </a:fontRef>
+          </p:style>
+        </p:cxnSp>
+        <p:cxnSp>
+          <p:nvCxnSpPr>
+            <p:cNvPr id="15" name="Straight Connector 14">
+              <a:extLst>
+                <a:ext uri="{FF2B5EF4-FFF2-40B4-BE49-F238E27FC236}">
+                  <a16:creationId xmlns:a16="http://schemas.microsoft.com/office/drawing/2014/main" id="{5D65D300-59B0-48D6-A86D-43A1B8500BA8}"/>
+                </a:ext>
+              </a:extLst>
+            </p:cNvPr>
+            <p:cNvCxnSpPr>
+              <a:cxnSpLocks/>
+            </p:cNvCxnSpPr>
+            <p:nvPr/>
+          </p:nvCxnSpPr>
+          <p:spPr>
+            <a:xfrm>
+              <a:off x="1896534" y="3708399"/>
+              <a:ext cx="4039555" cy="0"/>
+            </a:xfrm>
+            <a:prstGeom prst="line">
+              <a:avLst/>
+            </a:prstGeom>
+            <a:ln w="38100">
+              <a:solidFill>
+                <a:srgbClr val="FF0000"/>
+              </a:solidFill>
+            </a:ln>
+          </p:spPr>
+          <p:style>
+            <a:lnRef idx="1">
+              <a:schemeClr val="accent1"/>
+            </a:lnRef>
+            <a:fillRef idx="0">
+              <a:schemeClr val="accent1"/>
+            </a:fillRef>
+            <a:effectRef idx="0">
+              <a:schemeClr val="accent1"/>
+            </a:effectRef>
+            <a:fontRef idx="minor">
+              <a:schemeClr val="tx1"/>
+            </a:fontRef>
+          </p:style>
+        </p:cxnSp>
+      </p:grpSp>
+      <p:cxnSp>
+        <p:nvCxnSpPr>
+          <p:cNvPr id="18" name="Straight Connector 17">
+            <a:extLst>
+              <a:ext uri="{FF2B5EF4-FFF2-40B4-BE49-F238E27FC236}">
+                <a16:creationId xmlns:a16="http://schemas.microsoft.com/office/drawing/2014/main" id="{B6B20CE1-2631-482A-BDB3-58E2C512EC48}"/>
+              </a:ext>
+            </a:extLst>
+          </p:cNvPr>
+          <p:cNvCxnSpPr/>
+          <p:nvPr/>
+        </p:nvCxnSpPr>
+        <p:spPr>
+          <a:xfrm>
+            <a:off x="4772277" y="1439196"/>
+            <a:ext cx="0" cy="2201470"/>
+          </a:xfrm>
+          <a:prstGeom prst="line">
+            <a:avLst/>
+          </a:prstGeom>
+          <a:ln w="38100">
+            <a:solidFill>
+              <a:srgbClr val="FF0000"/>
+            </a:solidFill>
+          </a:ln>
+        </p:spPr>
+        <p:style>
+          <a:lnRef idx="1">
+            <a:schemeClr val="accent1"/>
+          </a:lnRef>
+          <a:fillRef idx="0">
+            <a:schemeClr val="accent1"/>
+          </a:fillRef>
+          <a:effectRef idx="0">
+            <a:schemeClr val="accent1"/>
+          </a:effectRef>
+          <a:fontRef idx="minor">
+            <a:schemeClr val="tx1"/>
+          </a:fontRef>
+        </p:style>
+      </p:cxnSp>
+      <p:sp>
+        <p:nvSpPr>
+          <p:cNvPr id="22" name="TextBox 21">
+            <a:extLst>
+              <a:ext uri="{FF2B5EF4-FFF2-40B4-BE49-F238E27FC236}">
+                <a16:creationId xmlns:a16="http://schemas.microsoft.com/office/drawing/2014/main" id="{A0115BC3-C069-4581-A175-8EC5C9F958FA}"/>
+              </a:ext>
+            </a:extLst>
+          </p:cNvPr>
+          <p:cNvSpPr txBox="1"/>
+          <p:nvPr/>
+        </p:nvSpPr>
+        <p:spPr>
+          <a:xfrm>
+            <a:off x="5808133" y="1439196"/>
+            <a:ext cx="4233334" cy="646331"/>
+          </a:xfrm>
+          <a:prstGeom prst="rect">
+            <a:avLst/>
+          </a:prstGeom>
+          <a:noFill/>
+        </p:spPr>
+        <p:txBody>
+          <a:bodyPr wrap="square" rtlCol="0">
+            <a:spAutoFit/>
+          </a:bodyPr>
+          <a:lstStyle/>
+          <a:p>
+            <a:r>
+              <a:rPr lang="en-GB" dirty="0"/>
+              <a:t>Everything bounded by the red lines is a separate thread</a:t>
+            </a:r>
+          </a:p>
+        </p:txBody>
+      </p:sp>
+      <p:sp>
+        <p:nvSpPr>
+          <p:cNvPr id="23" name="TextBox 22">
+            <a:extLst>
+              <a:ext uri="{FF2B5EF4-FFF2-40B4-BE49-F238E27FC236}">
+                <a16:creationId xmlns:a16="http://schemas.microsoft.com/office/drawing/2014/main" id="{28AD8FF0-3DF3-4DFF-A708-FF00E0C3FBBE}"/>
+              </a:ext>
+            </a:extLst>
+          </p:cNvPr>
+          <p:cNvSpPr txBox="1"/>
+          <p:nvPr/>
+        </p:nvSpPr>
+        <p:spPr>
+          <a:xfrm>
+            <a:off x="5867746" y="2228671"/>
+            <a:ext cx="3784600" cy="1200329"/>
+          </a:xfrm>
+          <a:prstGeom prst="rect">
+            <a:avLst/>
+          </a:prstGeom>
+          <a:noFill/>
+        </p:spPr>
+        <p:txBody>
+          <a:bodyPr wrap="square" rtlCol="0">
+            <a:spAutoFit/>
+          </a:bodyPr>
+          <a:lstStyle/>
+          <a:p>
+            <a:r>
+              <a:rPr lang="en-GB" dirty="0"/>
+              <a:t>Each column (or layer) can be computed separately to every </a:t>
+            </a:r>
+            <a:r>
+              <a:rPr lang="en-GB" dirty="0" err="1"/>
+              <a:t>toher</a:t>
+            </a:r>
+            <a:r>
+              <a:rPr lang="en-GB" dirty="0"/>
+              <a:t> column (though must be performed in sequence)</a:t>
+            </a:r>
+          </a:p>
+        </p:txBody>
+      </p:sp>
+      <p:sp>
+        <p:nvSpPr>
+          <p:cNvPr id="24" name="TextBox 23">
+            <a:extLst>
+              <a:ext uri="{FF2B5EF4-FFF2-40B4-BE49-F238E27FC236}">
+                <a16:creationId xmlns:a16="http://schemas.microsoft.com/office/drawing/2014/main" id="{7FA96E31-78BE-455F-8E97-693A93F898BA}"/>
+              </a:ext>
+            </a:extLst>
+          </p:cNvPr>
+          <p:cNvSpPr txBox="1"/>
+          <p:nvPr/>
+        </p:nvSpPr>
+        <p:spPr>
+          <a:xfrm>
+            <a:off x="635000" y="3937000"/>
+            <a:ext cx="4794812" cy="923330"/>
+          </a:xfrm>
+          <a:prstGeom prst="rect">
+            <a:avLst/>
+          </a:prstGeom>
+          <a:noFill/>
+        </p:spPr>
+        <p:txBody>
+          <a:bodyPr wrap="square" rtlCol="0">
+            <a:spAutoFit/>
+          </a:bodyPr>
+          <a:lstStyle/>
+          <a:p>
+            <a:r>
+              <a:rPr lang="en-GB" dirty="0"/>
+              <a:t>Each thread in layer 3 and 5, however, both depend on every thread in the previous layer having finished.</a:t>
+            </a:r>
+          </a:p>
+        </p:txBody>
+      </p:sp>
+      <p:sp>
+        <p:nvSpPr>
+          <p:cNvPr id="25" name="TextBox 24">
+            <a:extLst>
+              <a:ext uri="{FF2B5EF4-FFF2-40B4-BE49-F238E27FC236}">
+                <a16:creationId xmlns:a16="http://schemas.microsoft.com/office/drawing/2014/main" id="{EA1722F8-3979-4047-8B25-EC689998820B}"/>
+              </a:ext>
+            </a:extLst>
+          </p:cNvPr>
+          <p:cNvSpPr txBox="1"/>
+          <p:nvPr/>
+        </p:nvSpPr>
+        <p:spPr>
+          <a:xfrm>
+            <a:off x="5867746" y="3857611"/>
+            <a:ext cx="4794812" cy="923330"/>
+          </a:xfrm>
+          <a:prstGeom prst="rect">
+            <a:avLst/>
+          </a:prstGeom>
+          <a:noFill/>
+        </p:spPr>
+        <p:txBody>
+          <a:bodyPr wrap="square" rtlCol="0">
+            <a:spAutoFit/>
+          </a:bodyPr>
+          <a:lstStyle/>
+          <a:p>
+            <a:r>
+              <a:rPr lang="en-GB" dirty="0"/>
+              <a:t>Layer 2 depends on two threads (one for each used equation) from the previous layer also finishing.</a:t>
+            </a:r>
+          </a:p>
+        </p:txBody>
+      </p:sp>
+    </p:spTree>
+    <p:extLst>
+      <p:ext uri="{BB962C8B-B14F-4D97-AF65-F5344CB8AC3E}">
+        <p14:creationId xmlns:p14="http://schemas.microsoft.com/office/powerpoint/2010/main" val="2927805077"/>
+      </p:ext>
+    </p:extLst>
+  </p:cSld>
+  <p:clrMapOvr>
+    <a:masterClrMapping/>
+  </p:clrMapOvr>
+</p:sld>
+</file>
+
+<file path=ppt/slides/slide8.xml><?xml version="1.0" encoding="utf-8"?>
+<p:sld xmlns:a="http://schemas.openxmlformats.org/drawingml/2006/main" xmlns:r="http://schemas.openxmlformats.org/officeDocument/2006/relationships" xmlns:p="http://schemas.openxmlformats.org/presentationml/2006/main">
+  <p:cSld>
+    <p:spTree>
+      <p:nvGrpSpPr>
+        <p:cNvPr id="1" name=""/>
+        <p:cNvGrpSpPr/>
+        <p:nvPr/>
+      </p:nvGrpSpPr>
+      <p:grpSpPr>
+        <a:xfrm>
+          <a:off x="0" y="0"/>
+          <a:ext cx="0" cy="0"/>
+          <a:chOff x="0" y="0"/>
+          <a:chExt cx="0" cy="0"/>
+        </a:xfrm>
+      </p:grpSpPr>
+      <p:sp>
+        <p:nvSpPr>
+          <p:cNvPr id="2" name="Title 1">
+            <a:extLst>
+              <a:ext uri="{FF2B5EF4-FFF2-40B4-BE49-F238E27FC236}">
+                <a16:creationId xmlns:a16="http://schemas.microsoft.com/office/drawing/2014/main" id="{F026D84A-E052-4781-A747-E984A89A47E5}"/>
+              </a:ext>
+            </a:extLst>
+          </p:cNvPr>
+          <p:cNvSpPr>
+            <a:spLocks noGrp="1"/>
+          </p:cNvSpPr>
+          <p:nvPr>
+            <p:ph type="title"/>
+          </p:nvPr>
+        </p:nvSpPr>
+        <p:spPr/>
+        <p:txBody>
+          <a:bodyPr/>
+          <a:lstStyle/>
+          <a:p>
+            <a:r>
+              <a:rPr lang="en-GB" dirty="0"/>
+              <a:t>Parallelisation</a:t>
+            </a:r>
+          </a:p>
+        </p:txBody>
+      </p:sp>
+      <p:sp>
+        <p:nvSpPr>
+          <p:cNvPr id="3" name="Content Placeholder 2">
+            <a:extLst>
+              <a:ext uri="{FF2B5EF4-FFF2-40B4-BE49-F238E27FC236}">
+                <a16:creationId xmlns:a16="http://schemas.microsoft.com/office/drawing/2014/main" id="{E84F5807-492C-49DA-8B53-D5ADD42F56D9}"/>
+              </a:ext>
+            </a:extLst>
+          </p:cNvPr>
+          <p:cNvSpPr>
+            <a:spLocks noGrp="1"/>
+          </p:cNvSpPr>
+          <p:nvPr>
+            <p:ph idx="1"/>
+          </p:nvPr>
+        </p:nvSpPr>
+        <p:spPr>
+          <a:xfrm>
+            <a:off x="838200" y="1825625"/>
+            <a:ext cx="4773328" cy="1398838"/>
+          </a:xfrm>
+        </p:spPr>
+        <p:txBody>
+          <a:bodyPr>
+            <a:normAutofit fontScale="85000" lnSpcReduction="20000"/>
+          </a:bodyPr>
+          <a:lstStyle/>
+          <a:p>
+            <a:pPr marL="0" indent="0">
+              <a:buNone/>
+            </a:pPr>
+            <a:r>
+              <a:rPr lang="en-GB" dirty="0"/>
+              <a:t>PSO parallelisation is rarely done due to a potential loss of it’s convergence properties. However due to the large amount of computation time PSO takes, parallelisation is worth it.</a:t>
+            </a:r>
+          </a:p>
+        </p:txBody>
+      </p:sp>
+      <p:pic>
+        <p:nvPicPr>
+          <p:cNvPr id="4" name="Picture 3">
+            <a:extLst>
+              <a:ext uri="{FF2B5EF4-FFF2-40B4-BE49-F238E27FC236}">
+                <a16:creationId xmlns:a16="http://schemas.microsoft.com/office/drawing/2014/main" id="{EC69696D-8338-48A3-B2C3-403B5D34F6FF}"/>
+              </a:ext>
+            </a:extLst>
+          </p:cNvPr>
+          <p:cNvPicPr>
+            <a:picLocks noChangeAspect="1"/>
+          </p:cNvPicPr>
+          <p:nvPr/>
+        </p:nvPicPr>
+        <p:blipFill>
+          <a:blip r:embed="rId2"/>
+          <a:stretch>
+            <a:fillRect/>
+          </a:stretch>
+        </p:blipFill>
+        <p:spPr>
+          <a:xfrm>
+            <a:off x="7854264" y="520031"/>
+            <a:ext cx="3971925" cy="4010025"/>
+          </a:xfrm>
+          <a:prstGeom prst="rect">
+            <a:avLst/>
+          </a:prstGeom>
+        </p:spPr>
+      </p:pic>
+      <p:pic>
+        <p:nvPicPr>
+          <p:cNvPr id="7" name="Picture 6">
+            <a:extLst>
+              <a:ext uri="{FF2B5EF4-FFF2-40B4-BE49-F238E27FC236}">
+                <a16:creationId xmlns:a16="http://schemas.microsoft.com/office/drawing/2014/main" id="{3E1CE4D3-A853-4792-9F56-D96BA0BF5F48}"/>
+              </a:ext>
+            </a:extLst>
+          </p:cNvPr>
+          <p:cNvPicPr>
+            <a:picLocks noChangeAspect="1"/>
+          </p:cNvPicPr>
+          <p:nvPr/>
+        </p:nvPicPr>
+        <p:blipFill>
+          <a:blip r:embed="rId3"/>
+          <a:stretch>
+            <a:fillRect/>
+          </a:stretch>
+        </p:blipFill>
+        <p:spPr>
+          <a:xfrm>
+            <a:off x="8181474" y="4684962"/>
+            <a:ext cx="3644715" cy="1805326"/>
+          </a:xfrm>
+          <a:prstGeom prst="rect">
+            <a:avLst/>
+          </a:prstGeom>
+        </p:spPr>
+      </p:pic>
+      <p:sp>
+        <p:nvSpPr>
+          <p:cNvPr id="8" name="TextBox 7">
+            <a:extLst>
+              <a:ext uri="{FF2B5EF4-FFF2-40B4-BE49-F238E27FC236}">
+                <a16:creationId xmlns:a16="http://schemas.microsoft.com/office/drawing/2014/main" id="{38B86DA9-A9E9-4BB9-8679-E43AA2DDB9D2}"/>
+              </a:ext>
+            </a:extLst>
+          </p:cNvPr>
+          <p:cNvSpPr txBox="1"/>
+          <p:nvPr/>
+        </p:nvSpPr>
+        <p:spPr>
+          <a:xfrm>
+            <a:off x="4096655" y="365125"/>
+            <a:ext cx="4995560" cy="1169551"/>
+          </a:xfrm>
+          <a:prstGeom prst="rect">
+            <a:avLst/>
+          </a:prstGeom>
+          <a:noFill/>
+        </p:spPr>
+        <p:txBody>
+          <a:bodyPr wrap="square" rtlCol="0">
+            <a:spAutoFit/>
+          </a:bodyPr>
+          <a:lstStyle/>
+          <a:p>
+            <a:r>
+              <a:rPr lang="en-GB" sz="1400" i="1" dirty="0"/>
+              <a:t>Kim, Mun, Kim, </a:t>
+            </a:r>
+            <a:r>
+              <a:rPr lang="en-GB" sz="1400" i="1" dirty="0" err="1"/>
+              <a:t>HoPark</a:t>
+            </a:r>
+            <a:r>
+              <a:rPr lang="en-GB" sz="1400" dirty="0"/>
+              <a:t> (2011), Optimal power system operation using parallel processing system and PSO algorithm in </a:t>
+            </a:r>
+            <a:r>
+              <a:rPr lang="en-GB" sz="1400" i="1" dirty="0"/>
+              <a:t>International Journal of Electrical Power &amp; Energy Systems</a:t>
+            </a:r>
+            <a:r>
+              <a:rPr lang="en-GB" sz="1400" dirty="0"/>
+              <a:t>, Volume 33, Issue 8, October 2011, Pages 1457-1461</a:t>
+            </a:r>
+          </a:p>
+          <a:p>
+            <a:endParaRPr lang="en-GB" sz="1400" dirty="0"/>
+          </a:p>
+        </p:txBody>
+      </p:sp>
+      <p:sp>
+        <p:nvSpPr>
+          <p:cNvPr id="9" name="Content Placeholder 2">
+            <a:extLst>
+              <a:ext uri="{FF2B5EF4-FFF2-40B4-BE49-F238E27FC236}">
+                <a16:creationId xmlns:a16="http://schemas.microsoft.com/office/drawing/2014/main" id="{C22500B0-CCBD-4F44-9A06-168E57F0D6C0}"/>
+              </a:ext>
+            </a:extLst>
+          </p:cNvPr>
+          <p:cNvSpPr txBox="1">
+            <a:spLocks/>
+          </p:cNvSpPr>
+          <p:nvPr/>
+        </p:nvSpPr>
+        <p:spPr>
+          <a:xfrm>
+            <a:off x="838200" y="3703637"/>
+            <a:ext cx="4773328" cy="1398838"/>
+          </a:xfrm>
+          <a:prstGeom prst="rect">
+            <a:avLst/>
+          </a:prstGeom>
+        </p:spPr>
+        <p:txBody>
+          <a:bodyPr vert="horz" lIns="91440" tIns="45720" rIns="91440" bIns="45720" rtlCol="0">
+            <a:normAutofit/>
+          </a:bodyPr>
+          <a:lstStyle>
+            <a:lvl1pPr marL="228600" indent="-228600" algn="l" defTabSz="914400" rtl="0" eaLnBrk="1" latinLnBrk="0" hangingPunct="1">
+              <a:lnSpc>
+                <a:spcPct val="90000"/>
+              </a:lnSpc>
+              <a:spcBef>
+                <a:spcPts val="1000"/>
+              </a:spcBef>
+              <a:buFont typeface="Arial" panose="020B0604020202020204" pitchFamily="34" charset="0"/>
+              <a:buChar char="•"/>
+              <a:defRPr sz="2800" kern="1200">
+                <a:solidFill>
+                  <a:schemeClr val="tx1"/>
+                </a:solidFill>
+                <a:latin typeface="+mn-lt"/>
+                <a:ea typeface="+mn-ea"/>
+                <a:cs typeface="+mn-cs"/>
+              </a:defRPr>
+            </a:lvl1pPr>
+            <a:lvl2pPr marL="685800" indent="-228600" algn="l" defTabSz="914400" rtl="0" eaLnBrk="1" latinLnBrk="0" hangingPunct="1">
+              <a:lnSpc>
+                <a:spcPct val="90000"/>
+              </a:lnSpc>
+              <a:spcBef>
+                <a:spcPts val="500"/>
+              </a:spcBef>
+              <a:buFont typeface="Arial" panose="020B0604020202020204" pitchFamily="34" charset="0"/>
+              <a:buChar char="•"/>
+              <a:defRPr sz="2400" kern="1200">
+                <a:solidFill>
+                  <a:schemeClr val="tx1"/>
+                </a:solidFill>
+                <a:latin typeface="+mn-lt"/>
+                <a:ea typeface="+mn-ea"/>
+                <a:cs typeface="+mn-cs"/>
+              </a:defRPr>
+            </a:lvl2pPr>
+            <a:lvl3pPr marL="1143000" indent="-228600" algn="l" defTabSz="914400" rtl="0" eaLnBrk="1" latinLnBrk="0" hangingPunct="1">
+              <a:lnSpc>
+                <a:spcPct val="90000"/>
+              </a:lnSpc>
+              <a:spcBef>
+                <a:spcPts val="500"/>
+              </a:spcBef>
+              <a:buFont typeface="Arial" panose="020B0604020202020204" pitchFamily="34" charset="0"/>
+              <a:buChar char="•"/>
+              <a:defRPr sz="2000" kern="1200">
+                <a:solidFill>
+                  <a:schemeClr val="tx1"/>
+                </a:solidFill>
+                <a:latin typeface="+mn-lt"/>
+                <a:ea typeface="+mn-ea"/>
+                <a:cs typeface="+mn-cs"/>
+              </a:defRPr>
+            </a:lvl3pPr>
+            <a:lvl4pPr marL="1600200" indent="-228600" algn="l" defTabSz="914400" rtl="0" eaLnBrk="1" latinLnBrk="0" hangingPunct="1">
+              <a:lnSpc>
+                <a:spcPct val="90000"/>
+              </a:lnSpc>
+              <a:spcBef>
+                <a:spcPts val="500"/>
+              </a:spcBef>
+              <a:buFont typeface="Arial" panose="020B0604020202020204" pitchFamily="34" charset="0"/>
+              <a:buChar char="•"/>
+              <a:defRPr sz="1800" kern="1200">
+                <a:solidFill>
+                  <a:schemeClr val="tx1"/>
+                </a:solidFill>
+                <a:latin typeface="+mn-lt"/>
+                <a:ea typeface="+mn-ea"/>
+                <a:cs typeface="+mn-cs"/>
+              </a:defRPr>
+            </a:lvl4pPr>
+            <a:lvl5pPr marL="2057400" indent="-228600" algn="l" defTabSz="914400" rtl="0" eaLnBrk="1" latinLnBrk="0" hangingPunct="1">
+              <a:lnSpc>
+                <a:spcPct val="90000"/>
+              </a:lnSpc>
+              <a:spcBef>
+                <a:spcPts val="500"/>
+              </a:spcBef>
+              <a:buFont typeface="Arial" panose="020B0604020202020204" pitchFamily="34" charset="0"/>
+              <a:buChar char="•"/>
+              <a:defRPr sz="1800" kern="1200">
+                <a:solidFill>
+                  <a:schemeClr val="tx1"/>
+                </a:solidFill>
+                <a:latin typeface="+mn-lt"/>
+                <a:ea typeface="+mn-ea"/>
+                <a:cs typeface="+mn-cs"/>
+              </a:defRPr>
+            </a:lvl5pPr>
+            <a:lvl6pPr marL="2514600" indent="-228600" algn="l" defTabSz="914400" rtl="0" eaLnBrk="1" latinLnBrk="0" hangingPunct="1">
+              <a:lnSpc>
+                <a:spcPct val="90000"/>
+              </a:lnSpc>
+              <a:spcBef>
+                <a:spcPts val="500"/>
+              </a:spcBef>
+              <a:buFont typeface="Arial" panose="020B0604020202020204" pitchFamily="34" charset="0"/>
+              <a:buChar char="•"/>
+              <a:defRPr sz="1800" kern="1200">
+                <a:solidFill>
+                  <a:schemeClr val="tx1"/>
+                </a:solidFill>
+                <a:latin typeface="+mn-lt"/>
+                <a:ea typeface="+mn-ea"/>
+                <a:cs typeface="+mn-cs"/>
+              </a:defRPr>
+            </a:lvl6pPr>
+            <a:lvl7pPr marL="2971800" indent="-228600" algn="l" defTabSz="914400" rtl="0" eaLnBrk="1" latinLnBrk="0" hangingPunct="1">
+              <a:lnSpc>
+                <a:spcPct val="90000"/>
+              </a:lnSpc>
+              <a:spcBef>
+                <a:spcPts val="500"/>
+              </a:spcBef>
+              <a:buFont typeface="Arial" panose="020B0604020202020204" pitchFamily="34" charset="0"/>
+              <a:buChar char="•"/>
+              <a:defRPr sz="1800" kern="1200">
+                <a:solidFill>
+                  <a:schemeClr val="tx1"/>
+                </a:solidFill>
+                <a:latin typeface="+mn-lt"/>
+                <a:ea typeface="+mn-ea"/>
+                <a:cs typeface="+mn-cs"/>
+              </a:defRPr>
+            </a:lvl7pPr>
+            <a:lvl8pPr marL="3429000" indent="-228600" algn="l" defTabSz="914400" rtl="0" eaLnBrk="1" latinLnBrk="0" hangingPunct="1">
+              <a:lnSpc>
+                <a:spcPct val="90000"/>
+              </a:lnSpc>
+              <a:spcBef>
+                <a:spcPts val="500"/>
+              </a:spcBef>
+              <a:buFont typeface="Arial" panose="020B0604020202020204" pitchFamily="34" charset="0"/>
+              <a:buChar char="•"/>
+              <a:defRPr sz="1800" kern="1200">
+                <a:solidFill>
+                  <a:schemeClr val="tx1"/>
+                </a:solidFill>
+                <a:latin typeface="+mn-lt"/>
+                <a:ea typeface="+mn-ea"/>
+                <a:cs typeface="+mn-cs"/>
+              </a:defRPr>
+            </a:lvl8pPr>
+            <a:lvl9pPr marL="3886200" indent="-228600" algn="l" defTabSz="914400" rtl="0" eaLnBrk="1" latinLnBrk="0" hangingPunct="1">
+              <a:lnSpc>
+                <a:spcPct val="90000"/>
+              </a:lnSpc>
+              <a:spcBef>
+                <a:spcPts val="500"/>
+              </a:spcBef>
+              <a:buFont typeface="Arial" panose="020B0604020202020204" pitchFamily="34" charset="0"/>
+              <a:buChar char="•"/>
+              <a:defRPr sz="1800" kern="1200">
+                <a:solidFill>
+                  <a:schemeClr val="tx1"/>
+                </a:solidFill>
+                <a:latin typeface="+mn-lt"/>
+                <a:ea typeface="+mn-ea"/>
+                <a:cs typeface="+mn-cs"/>
+              </a:defRPr>
+            </a:lvl9pPr>
+          </a:lstStyle>
+          <a:p>
+            <a:pPr marL="0" indent="0">
+              <a:buFont typeface="Arial" panose="020B0604020202020204" pitchFamily="34" charset="0"/>
+              <a:buNone/>
+            </a:pPr>
+            <a:r>
+              <a:rPr lang="en-GB" dirty="0"/>
+              <a:t>The entire population is divided into sub-populations that share the burden of </a:t>
+            </a:r>
+            <a:r>
+              <a:rPr lang="en-GB" dirty="0" err="1"/>
+              <a:t>calucalation</a:t>
+            </a:r>
+            <a:endParaRPr lang="en-GB" dirty="0"/>
+          </a:p>
+        </p:txBody>
+      </p:sp>
+    </p:spTree>
+    <p:extLst>
+      <p:ext uri="{BB962C8B-B14F-4D97-AF65-F5344CB8AC3E}">
+        <p14:creationId xmlns:p14="http://schemas.microsoft.com/office/powerpoint/2010/main" val="2160837436"/>
+      </p:ext>
+    </p:extLst>
+  </p:cSld>
+  <p:clrMapOvr>
+    <a:masterClrMapping/>
+  </p:clrMapOvr>
+</p:sld>
+</file>
+
+<file path=ppt/slides/slide9.xml><?xml version="1.0" encoding="utf-8"?>
+<p:sld xmlns:a="http://schemas.openxmlformats.org/drawingml/2006/main" xmlns:r="http://schemas.openxmlformats.org/officeDocument/2006/relationships" xmlns:p="http://schemas.openxmlformats.org/presentationml/2006/main">
+  <p:cSld>
+    <p:spTree>
+      <p:nvGrpSpPr>
+        <p:cNvPr id="1" name=""/>
+        <p:cNvGrpSpPr/>
+        <p:nvPr/>
+      </p:nvGrpSpPr>
+      <p:grpSpPr>
+        <a:xfrm>
+          <a:off x="0" y="0"/>
+          <a:ext cx="0" cy="0"/>
+          <a:chOff x="0" y="0"/>
+          <a:chExt cx="0" cy="0"/>
+        </a:xfrm>
+      </p:grpSpPr>
+      <p:sp>
+        <p:nvSpPr>
+          <p:cNvPr id="2" name="Title 1">
+            <a:extLst>
+              <a:ext uri="{FF2B5EF4-FFF2-40B4-BE49-F238E27FC236}">
+                <a16:creationId xmlns:a16="http://schemas.microsoft.com/office/drawing/2014/main" id="{EA639789-474B-4F5D-A89E-6723AB0F6009}"/>
+              </a:ext>
+            </a:extLst>
+          </p:cNvPr>
+          <p:cNvSpPr>
+            <a:spLocks noGrp="1"/>
+          </p:cNvSpPr>
+          <p:nvPr>
+            <p:ph type="title"/>
+          </p:nvPr>
+        </p:nvSpPr>
+        <p:spPr/>
+        <p:txBody>
+          <a:bodyPr/>
+          <a:lstStyle/>
+          <a:p>
+            <a:r>
+              <a:rPr lang="en-GB" dirty="0"/>
+              <a:t>QA</a:t>
+            </a:r>
+          </a:p>
+        </p:txBody>
+      </p:sp>
+      <p:sp>
+        <p:nvSpPr>
+          <p:cNvPr id="3" name="Content Placeholder 2">
+            <a:extLst>
+              <a:ext uri="{FF2B5EF4-FFF2-40B4-BE49-F238E27FC236}">
+                <a16:creationId xmlns:a16="http://schemas.microsoft.com/office/drawing/2014/main" id="{3804ACD0-7792-4CE6-B264-FA2F43DB2526}"/>
+              </a:ext>
+            </a:extLst>
+          </p:cNvPr>
+          <p:cNvSpPr>
+            <a:spLocks noGrp="1"/>
+          </p:cNvSpPr>
+          <p:nvPr>
+            <p:ph idx="1"/>
+          </p:nvPr>
+        </p:nvSpPr>
+        <p:spPr/>
+        <p:txBody>
+          <a:bodyPr/>
+          <a:lstStyle/>
+          <a:p>
+            <a:endParaRPr lang="en-GB"/>
+          </a:p>
+        </p:txBody>
+      </p:sp>
+    </p:spTree>
+    <p:extLst>
+      <p:ext uri="{BB962C8B-B14F-4D97-AF65-F5344CB8AC3E}">
+        <p14:creationId xmlns:p14="http://schemas.microsoft.com/office/powerpoint/2010/main" val="3473359208"/>
       </p:ext>
     </p:extLst>
   </p:cSld>

</xml_diff>